<commit_message>
Updated my presentation with animations
</commit_message>
<xml_diff>
--- a/presentations/landing/Erdohegyi_Laszlo/java_ee_presentation_el.pptx
+++ b/presentations/landing/Erdohegyi_Laszlo/java_ee_presentation_el.pptx
@@ -1207,7 +1207,7 @@
               </a:spcBef>
               <a:buNone/>
             </a:pPr>
-            <a:endParaRPr/>
+            <a:endParaRPr dirty="0"/>
           </a:p>
         </p:txBody>
       </p:sp>
@@ -11848,6 +11848,13 @@
   <p:clrMapOvr>
     <a:masterClrMapping/>
   </p:clrMapOvr>
+  <p:timing>
+    <p:tnLst>
+      <p:par>
+        <p:cTn id="1" dur="indefinite" restart="never" nodeType="tmRoot"/>
+      </p:par>
+    </p:tnLst>
+  </p:timing>
 </p:sld>
 </file>
 
@@ -12039,6 +12046,13 @@
   <p:clrMapOvr>
     <a:masterClrMapping/>
   </p:clrMapOvr>
+  <p:timing>
+    <p:tnLst>
+      <p:par>
+        <p:cTn id="1" dur="indefinite" restart="never" nodeType="tmRoot"/>
+      </p:par>
+    </p:tnLst>
+  </p:timing>
 </p:sld>
 </file>
 
@@ -12180,7 +12194,7 @@
         <p:spPr>
           <a:xfrm>
             <a:off x="238897" y="1958774"/>
-            <a:ext cx="4467900" cy="1707900"/>
+            <a:ext cx="3894953" cy="1707900"/>
           </a:xfrm>
           <a:prstGeom prst="rect">
             <a:avLst/>
@@ -12270,8 +12284,8 @@
         </p:blipFill>
         <p:spPr>
           <a:xfrm>
-            <a:off x="4192674" y="1537562"/>
-            <a:ext cx="4679800" cy="2550325"/>
+            <a:off x="4401312" y="1537562"/>
+            <a:ext cx="4471162" cy="2436625"/>
           </a:xfrm>
           <a:prstGeom prst="rect">
             <a:avLst/>
@@ -12287,6 +12301,366 @@
   <p:clrMapOvr>
     <a:masterClrMapping/>
   </p:clrMapOvr>
+  <p:timing>
+    <p:tnLst>
+      <p:par>
+        <p:cTn id="1" dur="indefinite" restart="never" nodeType="tmRoot">
+          <p:childTnLst>
+            <p:seq concurrent="1" nextAc="seek">
+              <p:cTn id="2" dur="indefinite" nodeType="mainSeq">
+                <p:childTnLst>
+                  <p:par>
+                    <p:cTn id="3" fill="hold">
+                      <p:stCondLst>
+                        <p:cond delay="indefinite"/>
+                      </p:stCondLst>
+                      <p:childTnLst>
+                        <p:par>
+                          <p:cTn id="4" fill="hold">
+                            <p:stCondLst>
+                              <p:cond delay="0"/>
+                            </p:stCondLst>
+                            <p:childTnLst>
+                              <p:par>
+                                <p:cTn id="5" presetID="42" presetClass="entr" presetSubtype="0" fill="hold" grpId="0" nodeType="clickEffect">
+                                  <p:stCondLst>
+                                    <p:cond delay="0"/>
+                                  </p:stCondLst>
+                                  <p:childTnLst>
+                                    <p:set>
+                                      <p:cBhvr>
+                                        <p:cTn id="6" dur="1" fill="hold">
+                                          <p:stCondLst>
+                                            <p:cond delay="0"/>
+                                          </p:stCondLst>
+                                        </p:cTn>
+                                        <p:tgtEl>
+                                          <p:spTgt spid="98">
+                                            <p:txEl>
+                                              <p:pRg st="0" end="0"/>
+                                            </p:txEl>
+                                          </p:spTgt>
+                                        </p:tgtEl>
+                                        <p:attrNameLst>
+                                          <p:attrName>style.visibility</p:attrName>
+                                        </p:attrNameLst>
+                                      </p:cBhvr>
+                                      <p:to>
+                                        <p:strVal val="visible"/>
+                                      </p:to>
+                                    </p:set>
+                                    <p:animEffect transition="in" filter="fade">
+                                      <p:cBhvr>
+                                        <p:cTn id="7" dur="1000"/>
+                                        <p:tgtEl>
+                                          <p:spTgt spid="98">
+                                            <p:txEl>
+                                              <p:pRg st="0" end="0"/>
+                                            </p:txEl>
+                                          </p:spTgt>
+                                        </p:tgtEl>
+                                      </p:cBhvr>
+                                    </p:animEffect>
+                                    <p:anim calcmode="lin" valueType="num">
+                                      <p:cBhvr>
+                                        <p:cTn id="8" dur="1000" fill="hold"/>
+                                        <p:tgtEl>
+                                          <p:spTgt spid="98">
+                                            <p:txEl>
+                                              <p:pRg st="0" end="0"/>
+                                            </p:txEl>
+                                          </p:spTgt>
+                                        </p:tgtEl>
+                                        <p:attrNameLst>
+                                          <p:attrName>ppt_x</p:attrName>
+                                        </p:attrNameLst>
+                                      </p:cBhvr>
+                                      <p:tavLst>
+                                        <p:tav tm="0">
+                                          <p:val>
+                                            <p:strVal val="#ppt_x"/>
+                                          </p:val>
+                                        </p:tav>
+                                        <p:tav tm="100000">
+                                          <p:val>
+                                            <p:strVal val="#ppt_x"/>
+                                          </p:val>
+                                        </p:tav>
+                                      </p:tavLst>
+                                    </p:anim>
+                                    <p:anim calcmode="lin" valueType="num">
+                                      <p:cBhvr>
+                                        <p:cTn id="9" dur="1000" fill="hold"/>
+                                        <p:tgtEl>
+                                          <p:spTgt spid="98">
+                                            <p:txEl>
+                                              <p:pRg st="0" end="0"/>
+                                            </p:txEl>
+                                          </p:spTgt>
+                                        </p:tgtEl>
+                                        <p:attrNameLst>
+                                          <p:attrName>ppt_y</p:attrName>
+                                        </p:attrNameLst>
+                                      </p:cBhvr>
+                                      <p:tavLst>
+                                        <p:tav tm="0">
+                                          <p:val>
+                                            <p:strVal val="#ppt_y+.1"/>
+                                          </p:val>
+                                        </p:tav>
+                                        <p:tav tm="100000">
+                                          <p:val>
+                                            <p:strVal val="#ppt_y"/>
+                                          </p:val>
+                                        </p:tav>
+                                      </p:tavLst>
+                                    </p:anim>
+                                  </p:childTnLst>
+                                </p:cTn>
+                              </p:par>
+                            </p:childTnLst>
+                          </p:cTn>
+                        </p:par>
+                        <p:par>
+                          <p:cTn id="10" fill="hold">
+                            <p:stCondLst>
+                              <p:cond delay="1000"/>
+                            </p:stCondLst>
+                            <p:childTnLst>
+                              <p:par>
+                                <p:cTn id="11" presetID="42" presetClass="entr" presetSubtype="0" fill="hold" grpId="0" nodeType="afterEffect">
+                                  <p:stCondLst>
+                                    <p:cond delay="0"/>
+                                  </p:stCondLst>
+                                  <p:childTnLst>
+                                    <p:set>
+                                      <p:cBhvr>
+                                        <p:cTn id="12" dur="1" fill="hold">
+                                          <p:stCondLst>
+                                            <p:cond delay="0"/>
+                                          </p:stCondLst>
+                                        </p:cTn>
+                                        <p:tgtEl>
+                                          <p:spTgt spid="98">
+                                            <p:txEl>
+                                              <p:pRg st="1" end="1"/>
+                                            </p:txEl>
+                                          </p:spTgt>
+                                        </p:tgtEl>
+                                        <p:attrNameLst>
+                                          <p:attrName>style.visibility</p:attrName>
+                                        </p:attrNameLst>
+                                      </p:cBhvr>
+                                      <p:to>
+                                        <p:strVal val="visible"/>
+                                      </p:to>
+                                    </p:set>
+                                    <p:animEffect transition="in" filter="fade">
+                                      <p:cBhvr>
+                                        <p:cTn id="13" dur="1000"/>
+                                        <p:tgtEl>
+                                          <p:spTgt spid="98">
+                                            <p:txEl>
+                                              <p:pRg st="1" end="1"/>
+                                            </p:txEl>
+                                          </p:spTgt>
+                                        </p:tgtEl>
+                                      </p:cBhvr>
+                                    </p:animEffect>
+                                    <p:anim calcmode="lin" valueType="num">
+                                      <p:cBhvr>
+                                        <p:cTn id="14" dur="1000" fill="hold"/>
+                                        <p:tgtEl>
+                                          <p:spTgt spid="98">
+                                            <p:txEl>
+                                              <p:pRg st="1" end="1"/>
+                                            </p:txEl>
+                                          </p:spTgt>
+                                        </p:tgtEl>
+                                        <p:attrNameLst>
+                                          <p:attrName>ppt_x</p:attrName>
+                                        </p:attrNameLst>
+                                      </p:cBhvr>
+                                      <p:tavLst>
+                                        <p:tav tm="0">
+                                          <p:val>
+                                            <p:strVal val="#ppt_x"/>
+                                          </p:val>
+                                        </p:tav>
+                                        <p:tav tm="100000">
+                                          <p:val>
+                                            <p:strVal val="#ppt_x"/>
+                                          </p:val>
+                                        </p:tav>
+                                      </p:tavLst>
+                                    </p:anim>
+                                    <p:anim calcmode="lin" valueType="num">
+                                      <p:cBhvr>
+                                        <p:cTn id="15" dur="1000" fill="hold"/>
+                                        <p:tgtEl>
+                                          <p:spTgt spid="98">
+                                            <p:txEl>
+                                              <p:pRg st="1" end="1"/>
+                                            </p:txEl>
+                                          </p:spTgt>
+                                        </p:tgtEl>
+                                        <p:attrNameLst>
+                                          <p:attrName>ppt_y</p:attrName>
+                                        </p:attrNameLst>
+                                      </p:cBhvr>
+                                      <p:tavLst>
+                                        <p:tav tm="0">
+                                          <p:val>
+                                            <p:strVal val="#ppt_y+.1"/>
+                                          </p:val>
+                                        </p:tav>
+                                        <p:tav tm="100000">
+                                          <p:val>
+                                            <p:strVal val="#ppt_y"/>
+                                          </p:val>
+                                        </p:tav>
+                                      </p:tavLst>
+                                    </p:anim>
+                                  </p:childTnLst>
+                                </p:cTn>
+                              </p:par>
+                            </p:childTnLst>
+                          </p:cTn>
+                        </p:par>
+                        <p:par>
+                          <p:cTn id="16" fill="hold">
+                            <p:stCondLst>
+                              <p:cond delay="2000"/>
+                            </p:stCondLst>
+                            <p:childTnLst>
+                              <p:par>
+                                <p:cTn id="17" presetID="42" presetClass="entr" presetSubtype="0" fill="hold" grpId="0" nodeType="afterEffect">
+                                  <p:stCondLst>
+                                    <p:cond delay="0"/>
+                                  </p:stCondLst>
+                                  <p:childTnLst>
+                                    <p:set>
+                                      <p:cBhvr>
+                                        <p:cTn id="18" dur="1" fill="hold">
+                                          <p:stCondLst>
+                                            <p:cond delay="0"/>
+                                          </p:stCondLst>
+                                        </p:cTn>
+                                        <p:tgtEl>
+                                          <p:spTgt spid="98">
+                                            <p:txEl>
+                                              <p:pRg st="2" end="2"/>
+                                            </p:txEl>
+                                          </p:spTgt>
+                                        </p:tgtEl>
+                                        <p:attrNameLst>
+                                          <p:attrName>style.visibility</p:attrName>
+                                        </p:attrNameLst>
+                                      </p:cBhvr>
+                                      <p:to>
+                                        <p:strVal val="visible"/>
+                                      </p:to>
+                                    </p:set>
+                                    <p:animEffect transition="in" filter="fade">
+                                      <p:cBhvr>
+                                        <p:cTn id="19" dur="1000"/>
+                                        <p:tgtEl>
+                                          <p:spTgt spid="98">
+                                            <p:txEl>
+                                              <p:pRg st="2" end="2"/>
+                                            </p:txEl>
+                                          </p:spTgt>
+                                        </p:tgtEl>
+                                      </p:cBhvr>
+                                    </p:animEffect>
+                                    <p:anim calcmode="lin" valueType="num">
+                                      <p:cBhvr>
+                                        <p:cTn id="20" dur="1000" fill="hold"/>
+                                        <p:tgtEl>
+                                          <p:spTgt spid="98">
+                                            <p:txEl>
+                                              <p:pRg st="2" end="2"/>
+                                            </p:txEl>
+                                          </p:spTgt>
+                                        </p:tgtEl>
+                                        <p:attrNameLst>
+                                          <p:attrName>ppt_x</p:attrName>
+                                        </p:attrNameLst>
+                                      </p:cBhvr>
+                                      <p:tavLst>
+                                        <p:tav tm="0">
+                                          <p:val>
+                                            <p:strVal val="#ppt_x"/>
+                                          </p:val>
+                                        </p:tav>
+                                        <p:tav tm="100000">
+                                          <p:val>
+                                            <p:strVal val="#ppt_x"/>
+                                          </p:val>
+                                        </p:tav>
+                                      </p:tavLst>
+                                    </p:anim>
+                                    <p:anim calcmode="lin" valueType="num">
+                                      <p:cBhvr>
+                                        <p:cTn id="21" dur="1000" fill="hold"/>
+                                        <p:tgtEl>
+                                          <p:spTgt spid="98">
+                                            <p:txEl>
+                                              <p:pRg st="2" end="2"/>
+                                            </p:txEl>
+                                          </p:spTgt>
+                                        </p:tgtEl>
+                                        <p:attrNameLst>
+                                          <p:attrName>ppt_y</p:attrName>
+                                        </p:attrNameLst>
+                                      </p:cBhvr>
+                                      <p:tavLst>
+                                        <p:tav tm="0">
+                                          <p:val>
+                                            <p:strVal val="#ppt_y+.1"/>
+                                          </p:val>
+                                        </p:tav>
+                                        <p:tav tm="100000">
+                                          <p:val>
+                                            <p:strVal val="#ppt_y"/>
+                                          </p:val>
+                                        </p:tav>
+                                      </p:tavLst>
+                                    </p:anim>
+                                  </p:childTnLst>
+                                </p:cTn>
+                              </p:par>
+                            </p:childTnLst>
+                          </p:cTn>
+                        </p:par>
+                      </p:childTnLst>
+                    </p:cTn>
+                  </p:par>
+                </p:childTnLst>
+              </p:cTn>
+              <p:prevCondLst>
+                <p:cond evt="onPrev" delay="0">
+                  <p:tgtEl>
+                    <p:sldTgt/>
+                  </p:tgtEl>
+                </p:cond>
+              </p:prevCondLst>
+              <p:nextCondLst>
+                <p:cond evt="onNext" delay="0">
+                  <p:tgtEl>
+                    <p:sldTgt/>
+                  </p:tgtEl>
+                </p:cond>
+              </p:nextCondLst>
+            </p:seq>
+          </p:childTnLst>
+        </p:cTn>
+      </p:par>
+    </p:tnLst>
+    <p:bldLst>
+      <p:bldP spid="98" grpId="0" uiExpand="1" build="p"/>
+    </p:bldLst>
+  </p:timing>
 </p:sld>
 </file>
 
@@ -12428,7 +12802,7 @@
         <p:spPr>
           <a:xfrm>
             <a:off x="778650" y="1745275"/>
-            <a:ext cx="3814800" cy="2684400"/>
+            <a:ext cx="3275047" cy="1973285"/>
           </a:xfrm>
           <a:prstGeom prst="rect">
             <a:avLst/>
@@ -12575,6 +12949,578 @@
   <p:clrMapOvr>
     <a:masterClrMapping/>
   </p:clrMapOvr>
+  <p:timing>
+    <p:tnLst>
+      <p:par>
+        <p:cTn id="1" dur="indefinite" restart="never" nodeType="tmRoot">
+          <p:childTnLst>
+            <p:seq concurrent="1" nextAc="seek">
+              <p:cTn id="2" dur="indefinite" nodeType="mainSeq">
+                <p:childTnLst>
+                  <p:par>
+                    <p:cTn id="3" fill="hold">
+                      <p:stCondLst>
+                        <p:cond delay="indefinite"/>
+                      </p:stCondLst>
+                      <p:childTnLst>
+                        <p:par>
+                          <p:cTn id="4" fill="hold">
+                            <p:stCondLst>
+                              <p:cond delay="0"/>
+                            </p:stCondLst>
+                            <p:childTnLst>
+                              <p:par>
+                                <p:cTn id="5" presetID="42" presetClass="entr" presetSubtype="0" fill="hold" grpId="0" nodeType="clickEffect">
+                                  <p:stCondLst>
+                                    <p:cond delay="0"/>
+                                  </p:stCondLst>
+                                  <p:childTnLst>
+                                    <p:set>
+                                      <p:cBhvr>
+                                        <p:cTn id="6" dur="1" fill="hold">
+                                          <p:stCondLst>
+                                            <p:cond delay="0"/>
+                                          </p:stCondLst>
+                                        </p:cTn>
+                                        <p:tgtEl>
+                                          <p:spTgt spid="106">
+                                            <p:txEl>
+                                              <p:pRg st="0" end="0"/>
+                                            </p:txEl>
+                                          </p:spTgt>
+                                        </p:tgtEl>
+                                        <p:attrNameLst>
+                                          <p:attrName>style.visibility</p:attrName>
+                                        </p:attrNameLst>
+                                      </p:cBhvr>
+                                      <p:to>
+                                        <p:strVal val="visible"/>
+                                      </p:to>
+                                    </p:set>
+                                    <p:animEffect transition="in" filter="fade">
+                                      <p:cBhvr>
+                                        <p:cTn id="7" dur="1000"/>
+                                        <p:tgtEl>
+                                          <p:spTgt spid="106">
+                                            <p:txEl>
+                                              <p:pRg st="0" end="0"/>
+                                            </p:txEl>
+                                          </p:spTgt>
+                                        </p:tgtEl>
+                                      </p:cBhvr>
+                                    </p:animEffect>
+                                    <p:anim calcmode="lin" valueType="num">
+                                      <p:cBhvr>
+                                        <p:cTn id="8" dur="1000" fill="hold"/>
+                                        <p:tgtEl>
+                                          <p:spTgt spid="106">
+                                            <p:txEl>
+                                              <p:pRg st="0" end="0"/>
+                                            </p:txEl>
+                                          </p:spTgt>
+                                        </p:tgtEl>
+                                        <p:attrNameLst>
+                                          <p:attrName>ppt_x</p:attrName>
+                                        </p:attrNameLst>
+                                      </p:cBhvr>
+                                      <p:tavLst>
+                                        <p:tav tm="0">
+                                          <p:val>
+                                            <p:strVal val="#ppt_x"/>
+                                          </p:val>
+                                        </p:tav>
+                                        <p:tav tm="100000">
+                                          <p:val>
+                                            <p:strVal val="#ppt_x"/>
+                                          </p:val>
+                                        </p:tav>
+                                      </p:tavLst>
+                                    </p:anim>
+                                    <p:anim calcmode="lin" valueType="num">
+                                      <p:cBhvr>
+                                        <p:cTn id="9" dur="1000" fill="hold"/>
+                                        <p:tgtEl>
+                                          <p:spTgt spid="106">
+                                            <p:txEl>
+                                              <p:pRg st="0" end="0"/>
+                                            </p:txEl>
+                                          </p:spTgt>
+                                        </p:tgtEl>
+                                        <p:attrNameLst>
+                                          <p:attrName>ppt_y</p:attrName>
+                                        </p:attrNameLst>
+                                      </p:cBhvr>
+                                      <p:tavLst>
+                                        <p:tav tm="0">
+                                          <p:val>
+                                            <p:strVal val="#ppt_y+.1"/>
+                                          </p:val>
+                                        </p:tav>
+                                        <p:tav tm="100000">
+                                          <p:val>
+                                            <p:strVal val="#ppt_y"/>
+                                          </p:val>
+                                        </p:tav>
+                                      </p:tavLst>
+                                    </p:anim>
+                                  </p:childTnLst>
+                                </p:cTn>
+                              </p:par>
+                            </p:childTnLst>
+                          </p:cTn>
+                        </p:par>
+                        <p:par>
+                          <p:cTn id="10" fill="hold">
+                            <p:stCondLst>
+                              <p:cond delay="1000"/>
+                            </p:stCondLst>
+                            <p:childTnLst>
+                              <p:par>
+                                <p:cTn id="11" presetID="42" presetClass="entr" presetSubtype="0" fill="hold" grpId="0" nodeType="afterEffect">
+                                  <p:stCondLst>
+                                    <p:cond delay="0"/>
+                                  </p:stCondLst>
+                                  <p:childTnLst>
+                                    <p:set>
+                                      <p:cBhvr>
+                                        <p:cTn id="12" dur="1" fill="hold">
+                                          <p:stCondLst>
+                                            <p:cond delay="0"/>
+                                          </p:stCondLst>
+                                        </p:cTn>
+                                        <p:tgtEl>
+                                          <p:spTgt spid="106">
+                                            <p:txEl>
+                                              <p:pRg st="1" end="1"/>
+                                            </p:txEl>
+                                          </p:spTgt>
+                                        </p:tgtEl>
+                                        <p:attrNameLst>
+                                          <p:attrName>style.visibility</p:attrName>
+                                        </p:attrNameLst>
+                                      </p:cBhvr>
+                                      <p:to>
+                                        <p:strVal val="visible"/>
+                                      </p:to>
+                                    </p:set>
+                                    <p:animEffect transition="in" filter="fade">
+                                      <p:cBhvr>
+                                        <p:cTn id="13" dur="1000"/>
+                                        <p:tgtEl>
+                                          <p:spTgt spid="106">
+                                            <p:txEl>
+                                              <p:pRg st="1" end="1"/>
+                                            </p:txEl>
+                                          </p:spTgt>
+                                        </p:tgtEl>
+                                      </p:cBhvr>
+                                    </p:animEffect>
+                                    <p:anim calcmode="lin" valueType="num">
+                                      <p:cBhvr>
+                                        <p:cTn id="14" dur="1000" fill="hold"/>
+                                        <p:tgtEl>
+                                          <p:spTgt spid="106">
+                                            <p:txEl>
+                                              <p:pRg st="1" end="1"/>
+                                            </p:txEl>
+                                          </p:spTgt>
+                                        </p:tgtEl>
+                                        <p:attrNameLst>
+                                          <p:attrName>ppt_x</p:attrName>
+                                        </p:attrNameLst>
+                                      </p:cBhvr>
+                                      <p:tavLst>
+                                        <p:tav tm="0">
+                                          <p:val>
+                                            <p:strVal val="#ppt_x"/>
+                                          </p:val>
+                                        </p:tav>
+                                        <p:tav tm="100000">
+                                          <p:val>
+                                            <p:strVal val="#ppt_x"/>
+                                          </p:val>
+                                        </p:tav>
+                                      </p:tavLst>
+                                    </p:anim>
+                                    <p:anim calcmode="lin" valueType="num">
+                                      <p:cBhvr>
+                                        <p:cTn id="15" dur="1000" fill="hold"/>
+                                        <p:tgtEl>
+                                          <p:spTgt spid="106">
+                                            <p:txEl>
+                                              <p:pRg st="1" end="1"/>
+                                            </p:txEl>
+                                          </p:spTgt>
+                                        </p:tgtEl>
+                                        <p:attrNameLst>
+                                          <p:attrName>ppt_y</p:attrName>
+                                        </p:attrNameLst>
+                                      </p:cBhvr>
+                                      <p:tavLst>
+                                        <p:tav tm="0">
+                                          <p:val>
+                                            <p:strVal val="#ppt_y+.1"/>
+                                          </p:val>
+                                        </p:tav>
+                                        <p:tav tm="100000">
+                                          <p:val>
+                                            <p:strVal val="#ppt_y"/>
+                                          </p:val>
+                                        </p:tav>
+                                      </p:tavLst>
+                                    </p:anim>
+                                  </p:childTnLst>
+                                </p:cTn>
+                              </p:par>
+                            </p:childTnLst>
+                          </p:cTn>
+                        </p:par>
+                        <p:par>
+                          <p:cTn id="16" fill="hold">
+                            <p:stCondLst>
+                              <p:cond delay="2000"/>
+                            </p:stCondLst>
+                            <p:childTnLst>
+                              <p:par>
+                                <p:cTn id="17" presetID="42" presetClass="entr" presetSubtype="0" fill="hold" grpId="0" nodeType="afterEffect">
+                                  <p:stCondLst>
+                                    <p:cond delay="0"/>
+                                  </p:stCondLst>
+                                  <p:childTnLst>
+                                    <p:set>
+                                      <p:cBhvr>
+                                        <p:cTn id="18" dur="1" fill="hold">
+                                          <p:stCondLst>
+                                            <p:cond delay="0"/>
+                                          </p:stCondLst>
+                                        </p:cTn>
+                                        <p:tgtEl>
+                                          <p:spTgt spid="106">
+                                            <p:txEl>
+                                              <p:pRg st="2" end="2"/>
+                                            </p:txEl>
+                                          </p:spTgt>
+                                        </p:tgtEl>
+                                        <p:attrNameLst>
+                                          <p:attrName>style.visibility</p:attrName>
+                                        </p:attrNameLst>
+                                      </p:cBhvr>
+                                      <p:to>
+                                        <p:strVal val="visible"/>
+                                      </p:to>
+                                    </p:set>
+                                    <p:animEffect transition="in" filter="fade">
+                                      <p:cBhvr>
+                                        <p:cTn id="19" dur="1000"/>
+                                        <p:tgtEl>
+                                          <p:spTgt spid="106">
+                                            <p:txEl>
+                                              <p:pRg st="2" end="2"/>
+                                            </p:txEl>
+                                          </p:spTgt>
+                                        </p:tgtEl>
+                                      </p:cBhvr>
+                                    </p:animEffect>
+                                    <p:anim calcmode="lin" valueType="num">
+                                      <p:cBhvr>
+                                        <p:cTn id="20" dur="1000" fill="hold"/>
+                                        <p:tgtEl>
+                                          <p:spTgt spid="106">
+                                            <p:txEl>
+                                              <p:pRg st="2" end="2"/>
+                                            </p:txEl>
+                                          </p:spTgt>
+                                        </p:tgtEl>
+                                        <p:attrNameLst>
+                                          <p:attrName>ppt_x</p:attrName>
+                                        </p:attrNameLst>
+                                      </p:cBhvr>
+                                      <p:tavLst>
+                                        <p:tav tm="0">
+                                          <p:val>
+                                            <p:strVal val="#ppt_x"/>
+                                          </p:val>
+                                        </p:tav>
+                                        <p:tav tm="100000">
+                                          <p:val>
+                                            <p:strVal val="#ppt_x"/>
+                                          </p:val>
+                                        </p:tav>
+                                      </p:tavLst>
+                                    </p:anim>
+                                    <p:anim calcmode="lin" valueType="num">
+                                      <p:cBhvr>
+                                        <p:cTn id="21" dur="1000" fill="hold"/>
+                                        <p:tgtEl>
+                                          <p:spTgt spid="106">
+                                            <p:txEl>
+                                              <p:pRg st="2" end="2"/>
+                                            </p:txEl>
+                                          </p:spTgt>
+                                        </p:tgtEl>
+                                        <p:attrNameLst>
+                                          <p:attrName>ppt_y</p:attrName>
+                                        </p:attrNameLst>
+                                      </p:cBhvr>
+                                      <p:tavLst>
+                                        <p:tav tm="0">
+                                          <p:val>
+                                            <p:strVal val="#ppt_y+.1"/>
+                                          </p:val>
+                                        </p:tav>
+                                        <p:tav tm="100000">
+                                          <p:val>
+                                            <p:strVal val="#ppt_y"/>
+                                          </p:val>
+                                        </p:tav>
+                                      </p:tavLst>
+                                    </p:anim>
+                                  </p:childTnLst>
+                                </p:cTn>
+                              </p:par>
+                            </p:childTnLst>
+                          </p:cTn>
+                        </p:par>
+                        <p:par>
+                          <p:cTn id="22" fill="hold">
+                            <p:stCondLst>
+                              <p:cond delay="3000"/>
+                            </p:stCondLst>
+                            <p:childTnLst>
+                              <p:par>
+                                <p:cTn id="23" presetID="42" presetClass="entr" presetSubtype="0" fill="hold" grpId="0" nodeType="afterEffect">
+                                  <p:stCondLst>
+                                    <p:cond delay="0"/>
+                                  </p:stCondLst>
+                                  <p:childTnLst>
+                                    <p:set>
+                                      <p:cBhvr>
+                                        <p:cTn id="24" dur="1" fill="hold">
+                                          <p:stCondLst>
+                                            <p:cond delay="0"/>
+                                          </p:stCondLst>
+                                        </p:cTn>
+                                        <p:tgtEl>
+                                          <p:spTgt spid="106">
+                                            <p:txEl>
+                                              <p:pRg st="3" end="3"/>
+                                            </p:txEl>
+                                          </p:spTgt>
+                                        </p:tgtEl>
+                                        <p:attrNameLst>
+                                          <p:attrName>style.visibility</p:attrName>
+                                        </p:attrNameLst>
+                                      </p:cBhvr>
+                                      <p:to>
+                                        <p:strVal val="visible"/>
+                                      </p:to>
+                                    </p:set>
+                                    <p:animEffect transition="in" filter="fade">
+                                      <p:cBhvr>
+                                        <p:cTn id="25" dur="1000"/>
+                                        <p:tgtEl>
+                                          <p:spTgt spid="106">
+                                            <p:txEl>
+                                              <p:pRg st="3" end="3"/>
+                                            </p:txEl>
+                                          </p:spTgt>
+                                        </p:tgtEl>
+                                      </p:cBhvr>
+                                    </p:animEffect>
+                                    <p:anim calcmode="lin" valueType="num">
+                                      <p:cBhvr>
+                                        <p:cTn id="26" dur="1000" fill="hold"/>
+                                        <p:tgtEl>
+                                          <p:spTgt spid="106">
+                                            <p:txEl>
+                                              <p:pRg st="3" end="3"/>
+                                            </p:txEl>
+                                          </p:spTgt>
+                                        </p:tgtEl>
+                                        <p:attrNameLst>
+                                          <p:attrName>ppt_x</p:attrName>
+                                        </p:attrNameLst>
+                                      </p:cBhvr>
+                                      <p:tavLst>
+                                        <p:tav tm="0">
+                                          <p:val>
+                                            <p:strVal val="#ppt_x"/>
+                                          </p:val>
+                                        </p:tav>
+                                        <p:tav tm="100000">
+                                          <p:val>
+                                            <p:strVal val="#ppt_x"/>
+                                          </p:val>
+                                        </p:tav>
+                                      </p:tavLst>
+                                    </p:anim>
+                                    <p:anim calcmode="lin" valueType="num">
+                                      <p:cBhvr>
+                                        <p:cTn id="27" dur="1000" fill="hold"/>
+                                        <p:tgtEl>
+                                          <p:spTgt spid="106">
+                                            <p:txEl>
+                                              <p:pRg st="3" end="3"/>
+                                            </p:txEl>
+                                          </p:spTgt>
+                                        </p:tgtEl>
+                                        <p:attrNameLst>
+                                          <p:attrName>ppt_y</p:attrName>
+                                        </p:attrNameLst>
+                                      </p:cBhvr>
+                                      <p:tavLst>
+                                        <p:tav tm="0">
+                                          <p:val>
+                                            <p:strVal val="#ppt_y+.1"/>
+                                          </p:val>
+                                        </p:tav>
+                                        <p:tav tm="100000">
+                                          <p:val>
+                                            <p:strVal val="#ppt_y"/>
+                                          </p:val>
+                                        </p:tav>
+                                      </p:tavLst>
+                                    </p:anim>
+                                  </p:childTnLst>
+                                </p:cTn>
+                              </p:par>
+                            </p:childTnLst>
+                          </p:cTn>
+                        </p:par>
+                        <p:par>
+                          <p:cTn id="28" fill="hold">
+                            <p:stCondLst>
+                              <p:cond delay="4000"/>
+                            </p:stCondLst>
+                            <p:childTnLst>
+                              <p:par>
+                                <p:cTn id="29" presetID="42" presetClass="entr" presetSubtype="0" fill="hold" grpId="0" nodeType="afterEffect">
+                                  <p:stCondLst>
+                                    <p:cond delay="0"/>
+                                  </p:stCondLst>
+                                  <p:childTnLst>
+                                    <p:set>
+                                      <p:cBhvr>
+                                        <p:cTn id="30" dur="1" fill="hold">
+                                          <p:stCondLst>
+                                            <p:cond delay="0"/>
+                                          </p:stCondLst>
+                                        </p:cTn>
+                                        <p:tgtEl>
+                                          <p:spTgt spid="106">
+                                            <p:txEl>
+                                              <p:pRg st="4" end="4"/>
+                                            </p:txEl>
+                                          </p:spTgt>
+                                        </p:tgtEl>
+                                        <p:attrNameLst>
+                                          <p:attrName>style.visibility</p:attrName>
+                                        </p:attrNameLst>
+                                      </p:cBhvr>
+                                      <p:to>
+                                        <p:strVal val="visible"/>
+                                      </p:to>
+                                    </p:set>
+                                    <p:animEffect transition="in" filter="fade">
+                                      <p:cBhvr>
+                                        <p:cTn id="31" dur="1000"/>
+                                        <p:tgtEl>
+                                          <p:spTgt spid="106">
+                                            <p:txEl>
+                                              <p:pRg st="4" end="4"/>
+                                            </p:txEl>
+                                          </p:spTgt>
+                                        </p:tgtEl>
+                                      </p:cBhvr>
+                                    </p:animEffect>
+                                    <p:anim calcmode="lin" valueType="num">
+                                      <p:cBhvr>
+                                        <p:cTn id="32" dur="1000" fill="hold"/>
+                                        <p:tgtEl>
+                                          <p:spTgt spid="106">
+                                            <p:txEl>
+                                              <p:pRg st="4" end="4"/>
+                                            </p:txEl>
+                                          </p:spTgt>
+                                        </p:tgtEl>
+                                        <p:attrNameLst>
+                                          <p:attrName>ppt_x</p:attrName>
+                                        </p:attrNameLst>
+                                      </p:cBhvr>
+                                      <p:tavLst>
+                                        <p:tav tm="0">
+                                          <p:val>
+                                            <p:strVal val="#ppt_x"/>
+                                          </p:val>
+                                        </p:tav>
+                                        <p:tav tm="100000">
+                                          <p:val>
+                                            <p:strVal val="#ppt_x"/>
+                                          </p:val>
+                                        </p:tav>
+                                      </p:tavLst>
+                                    </p:anim>
+                                    <p:anim calcmode="lin" valueType="num">
+                                      <p:cBhvr>
+                                        <p:cTn id="33" dur="1000" fill="hold"/>
+                                        <p:tgtEl>
+                                          <p:spTgt spid="106">
+                                            <p:txEl>
+                                              <p:pRg st="4" end="4"/>
+                                            </p:txEl>
+                                          </p:spTgt>
+                                        </p:tgtEl>
+                                        <p:attrNameLst>
+                                          <p:attrName>ppt_y</p:attrName>
+                                        </p:attrNameLst>
+                                      </p:cBhvr>
+                                      <p:tavLst>
+                                        <p:tav tm="0">
+                                          <p:val>
+                                            <p:strVal val="#ppt_y+.1"/>
+                                          </p:val>
+                                        </p:tav>
+                                        <p:tav tm="100000">
+                                          <p:val>
+                                            <p:strVal val="#ppt_y"/>
+                                          </p:val>
+                                        </p:tav>
+                                      </p:tavLst>
+                                    </p:anim>
+                                  </p:childTnLst>
+                                </p:cTn>
+                              </p:par>
+                            </p:childTnLst>
+                          </p:cTn>
+                        </p:par>
+                      </p:childTnLst>
+                    </p:cTn>
+                  </p:par>
+                </p:childTnLst>
+              </p:cTn>
+              <p:prevCondLst>
+                <p:cond evt="onPrev" delay="0">
+                  <p:tgtEl>
+                    <p:sldTgt/>
+                  </p:tgtEl>
+                </p:cond>
+              </p:prevCondLst>
+              <p:nextCondLst>
+                <p:cond evt="onNext" delay="0">
+                  <p:tgtEl>
+                    <p:sldTgt/>
+                  </p:tgtEl>
+                </p:cond>
+              </p:nextCondLst>
+            </p:seq>
+          </p:childTnLst>
+        </p:cTn>
+      </p:par>
+    </p:tnLst>
+    <p:bldLst>
+      <p:bldP spid="106" grpId="0" uiExpand="1" build="p"/>
+    </p:bldLst>
+  </p:timing>
 </p:sld>
 </file>
 
@@ -12716,7 +13662,7 @@
         <p:spPr>
           <a:xfrm>
             <a:off x="807425" y="1923567"/>
-            <a:ext cx="3814800" cy="1924200"/>
+            <a:ext cx="2862367" cy="1924200"/>
           </a:xfrm>
           <a:prstGeom prst="rect">
             <a:avLst/>
@@ -12830,6 +13776,472 @@
   <p:clrMapOvr>
     <a:masterClrMapping/>
   </p:clrMapOvr>
+  <p:timing>
+    <p:tnLst>
+      <p:par>
+        <p:cTn id="1" dur="indefinite" restart="never" nodeType="tmRoot">
+          <p:childTnLst>
+            <p:seq concurrent="1" nextAc="seek">
+              <p:cTn id="2" dur="indefinite" nodeType="mainSeq">
+                <p:childTnLst>
+                  <p:par>
+                    <p:cTn id="3" fill="hold">
+                      <p:stCondLst>
+                        <p:cond delay="indefinite"/>
+                      </p:stCondLst>
+                      <p:childTnLst>
+                        <p:par>
+                          <p:cTn id="4" fill="hold">
+                            <p:stCondLst>
+                              <p:cond delay="0"/>
+                            </p:stCondLst>
+                            <p:childTnLst>
+                              <p:par>
+                                <p:cTn id="5" presetID="42" presetClass="entr" presetSubtype="0" fill="hold" grpId="0" nodeType="clickEffect">
+                                  <p:stCondLst>
+                                    <p:cond delay="0"/>
+                                  </p:stCondLst>
+                                  <p:childTnLst>
+                                    <p:set>
+                                      <p:cBhvr>
+                                        <p:cTn id="6" dur="1" fill="hold">
+                                          <p:stCondLst>
+                                            <p:cond delay="0"/>
+                                          </p:stCondLst>
+                                        </p:cTn>
+                                        <p:tgtEl>
+                                          <p:spTgt spid="114">
+                                            <p:txEl>
+                                              <p:pRg st="0" end="0"/>
+                                            </p:txEl>
+                                          </p:spTgt>
+                                        </p:tgtEl>
+                                        <p:attrNameLst>
+                                          <p:attrName>style.visibility</p:attrName>
+                                        </p:attrNameLst>
+                                      </p:cBhvr>
+                                      <p:to>
+                                        <p:strVal val="visible"/>
+                                      </p:to>
+                                    </p:set>
+                                    <p:animEffect transition="in" filter="fade">
+                                      <p:cBhvr>
+                                        <p:cTn id="7" dur="1000"/>
+                                        <p:tgtEl>
+                                          <p:spTgt spid="114">
+                                            <p:txEl>
+                                              <p:pRg st="0" end="0"/>
+                                            </p:txEl>
+                                          </p:spTgt>
+                                        </p:tgtEl>
+                                      </p:cBhvr>
+                                    </p:animEffect>
+                                    <p:anim calcmode="lin" valueType="num">
+                                      <p:cBhvr>
+                                        <p:cTn id="8" dur="1000" fill="hold"/>
+                                        <p:tgtEl>
+                                          <p:spTgt spid="114">
+                                            <p:txEl>
+                                              <p:pRg st="0" end="0"/>
+                                            </p:txEl>
+                                          </p:spTgt>
+                                        </p:tgtEl>
+                                        <p:attrNameLst>
+                                          <p:attrName>ppt_x</p:attrName>
+                                        </p:attrNameLst>
+                                      </p:cBhvr>
+                                      <p:tavLst>
+                                        <p:tav tm="0">
+                                          <p:val>
+                                            <p:strVal val="#ppt_x"/>
+                                          </p:val>
+                                        </p:tav>
+                                        <p:tav tm="100000">
+                                          <p:val>
+                                            <p:strVal val="#ppt_x"/>
+                                          </p:val>
+                                        </p:tav>
+                                      </p:tavLst>
+                                    </p:anim>
+                                    <p:anim calcmode="lin" valueType="num">
+                                      <p:cBhvr>
+                                        <p:cTn id="9" dur="1000" fill="hold"/>
+                                        <p:tgtEl>
+                                          <p:spTgt spid="114">
+                                            <p:txEl>
+                                              <p:pRg st="0" end="0"/>
+                                            </p:txEl>
+                                          </p:spTgt>
+                                        </p:tgtEl>
+                                        <p:attrNameLst>
+                                          <p:attrName>ppt_y</p:attrName>
+                                        </p:attrNameLst>
+                                      </p:cBhvr>
+                                      <p:tavLst>
+                                        <p:tav tm="0">
+                                          <p:val>
+                                            <p:strVal val="#ppt_y+.1"/>
+                                          </p:val>
+                                        </p:tav>
+                                        <p:tav tm="100000">
+                                          <p:val>
+                                            <p:strVal val="#ppt_y"/>
+                                          </p:val>
+                                        </p:tav>
+                                      </p:tavLst>
+                                    </p:anim>
+                                  </p:childTnLst>
+                                </p:cTn>
+                              </p:par>
+                            </p:childTnLst>
+                          </p:cTn>
+                        </p:par>
+                        <p:par>
+                          <p:cTn id="10" fill="hold">
+                            <p:stCondLst>
+                              <p:cond delay="1000"/>
+                            </p:stCondLst>
+                            <p:childTnLst>
+                              <p:par>
+                                <p:cTn id="11" presetID="42" presetClass="entr" presetSubtype="0" fill="hold" grpId="0" nodeType="afterEffect">
+                                  <p:stCondLst>
+                                    <p:cond delay="0"/>
+                                  </p:stCondLst>
+                                  <p:childTnLst>
+                                    <p:set>
+                                      <p:cBhvr>
+                                        <p:cTn id="12" dur="1" fill="hold">
+                                          <p:stCondLst>
+                                            <p:cond delay="0"/>
+                                          </p:stCondLst>
+                                        </p:cTn>
+                                        <p:tgtEl>
+                                          <p:spTgt spid="114">
+                                            <p:txEl>
+                                              <p:pRg st="1" end="1"/>
+                                            </p:txEl>
+                                          </p:spTgt>
+                                        </p:tgtEl>
+                                        <p:attrNameLst>
+                                          <p:attrName>style.visibility</p:attrName>
+                                        </p:attrNameLst>
+                                      </p:cBhvr>
+                                      <p:to>
+                                        <p:strVal val="visible"/>
+                                      </p:to>
+                                    </p:set>
+                                    <p:animEffect transition="in" filter="fade">
+                                      <p:cBhvr>
+                                        <p:cTn id="13" dur="1000"/>
+                                        <p:tgtEl>
+                                          <p:spTgt spid="114">
+                                            <p:txEl>
+                                              <p:pRg st="1" end="1"/>
+                                            </p:txEl>
+                                          </p:spTgt>
+                                        </p:tgtEl>
+                                      </p:cBhvr>
+                                    </p:animEffect>
+                                    <p:anim calcmode="lin" valueType="num">
+                                      <p:cBhvr>
+                                        <p:cTn id="14" dur="1000" fill="hold"/>
+                                        <p:tgtEl>
+                                          <p:spTgt spid="114">
+                                            <p:txEl>
+                                              <p:pRg st="1" end="1"/>
+                                            </p:txEl>
+                                          </p:spTgt>
+                                        </p:tgtEl>
+                                        <p:attrNameLst>
+                                          <p:attrName>ppt_x</p:attrName>
+                                        </p:attrNameLst>
+                                      </p:cBhvr>
+                                      <p:tavLst>
+                                        <p:tav tm="0">
+                                          <p:val>
+                                            <p:strVal val="#ppt_x"/>
+                                          </p:val>
+                                        </p:tav>
+                                        <p:tav tm="100000">
+                                          <p:val>
+                                            <p:strVal val="#ppt_x"/>
+                                          </p:val>
+                                        </p:tav>
+                                      </p:tavLst>
+                                    </p:anim>
+                                    <p:anim calcmode="lin" valueType="num">
+                                      <p:cBhvr>
+                                        <p:cTn id="15" dur="1000" fill="hold"/>
+                                        <p:tgtEl>
+                                          <p:spTgt spid="114">
+                                            <p:txEl>
+                                              <p:pRg st="1" end="1"/>
+                                            </p:txEl>
+                                          </p:spTgt>
+                                        </p:tgtEl>
+                                        <p:attrNameLst>
+                                          <p:attrName>ppt_y</p:attrName>
+                                        </p:attrNameLst>
+                                      </p:cBhvr>
+                                      <p:tavLst>
+                                        <p:tav tm="0">
+                                          <p:val>
+                                            <p:strVal val="#ppt_y+.1"/>
+                                          </p:val>
+                                        </p:tav>
+                                        <p:tav tm="100000">
+                                          <p:val>
+                                            <p:strVal val="#ppt_y"/>
+                                          </p:val>
+                                        </p:tav>
+                                      </p:tavLst>
+                                    </p:anim>
+                                  </p:childTnLst>
+                                </p:cTn>
+                              </p:par>
+                            </p:childTnLst>
+                          </p:cTn>
+                        </p:par>
+                        <p:par>
+                          <p:cTn id="16" fill="hold">
+                            <p:stCondLst>
+                              <p:cond delay="2000"/>
+                            </p:stCondLst>
+                            <p:childTnLst>
+                              <p:par>
+                                <p:cTn id="17" presetID="42" presetClass="entr" presetSubtype="0" fill="hold" grpId="0" nodeType="afterEffect">
+                                  <p:stCondLst>
+                                    <p:cond delay="0"/>
+                                  </p:stCondLst>
+                                  <p:childTnLst>
+                                    <p:set>
+                                      <p:cBhvr>
+                                        <p:cTn id="18" dur="1" fill="hold">
+                                          <p:stCondLst>
+                                            <p:cond delay="0"/>
+                                          </p:stCondLst>
+                                        </p:cTn>
+                                        <p:tgtEl>
+                                          <p:spTgt spid="114">
+                                            <p:txEl>
+                                              <p:pRg st="2" end="2"/>
+                                            </p:txEl>
+                                          </p:spTgt>
+                                        </p:tgtEl>
+                                        <p:attrNameLst>
+                                          <p:attrName>style.visibility</p:attrName>
+                                        </p:attrNameLst>
+                                      </p:cBhvr>
+                                      <p:to>
+                                        <p:strVal val="visible"/>
+                                      </p:to>
+                                    </p:set>
+                                    <p:animEffect transition="in" filter="fade">
+                                      <p:cBhvr>
+                                        <p:cTn id="19" dur="1000"/>
+                                        <p:tgtEl>
+                                          <p:spTgt spid="114">
+                                            <p:txEl>
+                                              <p:pRg st="2" end="2"/>
+                                            </p:txEl>
+                                          </p:spTgt>
+                                        </p:tgtEl>
+                                      </p:cBhvr>
+                                    </p:animEffect>
+                                    <p:anim calcmode="lin" valueType="num">
+                                      <p:cBhvr>
+                                        <p:cTn id="20" dur="1000" fill="hold"/>
+                                        <p:tgtEl>
+                                          <p:spTgt spid="114">
+                                            <p:txEl>
+                                              <p:pRg st="2" end="2"/>
+                                            </p:txEl>
+                                          </p:spTgt>
+                                        </p:tgtEl>
+                                        <p:attrNameLst>
+                                          <p:attrName>ppt_x</p:attrName>
+                                        </p:attrNameLst>
+                                      </p:cBhvr>
+                                      <p:tavLst>
+                                        <p:tav tm="0">
+                                          <p:val>
+                                            <p:strVal val="#ppt_x"/>
+                                          </p:val>
+                                        </p:tav>
+                                        <p:tav tm="100000">
+                                          <p:val>
+                                            <p:strVal val="#ppt_x"/>
+                                          </p:val>
+                                        </p:tav>
+                                      </p:tavLst>
+                                    </p:anim>
+                                    <p:anim calcmode="lin" valueType="num">
+                                      <p:cBhvr>
+                                        <p:cTn id="21" dur="1000" fill="hold"/>
+                                        <p:tgtEl>
+                                          <p:spTgt spid="114">
+                                            <p:txEl>
+                                              <p:pRg st="2" end="2"/>
+                                            </p:txEl>
+                                          </p:spTgt>
+                                        </p:tgtEl>
+                                        <p:attrNameLst>
+                                          <p:attrName>ppt_y</p:attrName>
+                                        </p:attrNameLst>
+                                      </p:cBhvr>
+                                      <p:tavLst>
+                                        <p:tav tm="0">
+                                          <p:val>
+                                            <p:strVal val="#ppt_y+.1"/>
+                                          </p:val>
+                                        </p:tav>
+                                        <p:tav tm="100000">
+                                          <p:val>
+                                            <p:strVal val="#ppt_y"/>
+                                          </p:val>
+                                        </p:tav>
+                                      </p:tavLst>
+                                    </p:anim>
+                                  </p:childTnLst>
+                                </p:cTn>
+                              </p:par>
+                            </p:childTnLst>
+                          </p:cTn>
+                        </p:par>
+                        <p:par>
+                          <p:cTn id="22" fill="hold">
+                            <p:stCondLst>
+                              <p:cond delay="3000"/>
+                            </p:stCondLst>
+                            <p:childTnLst>
+                              <p:par>
+                                <p:cTn id="23" presetID="42" presetClass="entr" presetSubtype="0" fill="hold" grpId="0" nodeType="afterEffect">
+                                  <p:stCondLst>
+                                    <p:cond delay="0"/>
+                                  </p:stCondLst>
+                                  <p:childTnLst>
+                                    <p:set>
+                                      <p:cBhvr>
+                                        <p:cTn id="24" dur="1" fill="hold">
+                                          <p:stCondLst>
+                                            <p:cond delay="0"/>
+                                          </p:stCondLst>
+                                        </p:cTn>
+                                        <p:tgtEl>
+                                          <p:spTgt spid="114">
+                                            <p:txEl>
+                                              <p:pRg st="3" end="3"/>
+                                            </p:txEl>
+                                          </p:spTgt>
+                                        </p:tgtEl>
+                                        <p:attrNameLst>
+                                          <p:attrName>style.visibility</p:attrName>
+                                        </p:attrNameLst>
+                                      </p:cBhvr>
+                                      <p:to>
+                                        <p:strVal val="visible"/>
+                                      </p:to>
+                                    </p:set>
+                                    <p:animEffect transition="in" filter="fade">
+                                      <p:cBhvr>
+                                        <p:cTn id="25" dur="1000"/>
+                                        <p:tgtEl>
+                                          <p:spTgt spid="114">
+                                            <p:txEl>
+                                              <p:pRg st="3" end="3"/>
+                                            </p:txEl>
+                                          </p:spTgt>
+                                        </p:tgtEl>
+                                      </p:cBhvr>
+                                    </p:animEffect>
+                                    <p:anim calcmode="lin" valueType="num">
+                                      <p:cBhvr>
+                                        <p:cTn id="26" dur="1000" fill="hold"/>
+                                        <p:tgtEl>
+                                          <p:spTgt spid="114">
+                                            <p:txEl>
+                                              <p:pRg st="3" end="3"/>
+                                            </p:txEl>
+                                          </p:spTgt>
+                                        </p:tgtEl>
+                                        <p:attrNameLst>
+                                          <p:attrName>ppt_x</p:attrName>
+                                        </p:attrNameLst>
+                                      </p:cBhvr>
+                                      <p:tavLst>
+                                        <p:tav tm="0">
+                                          <p:val>
+                                            <p:strVal val="#ppt_x"/>
+                                          </p:val>
+                                        </p:tav>
+                                        <p:tav tm="100000">
+                                          <p:val>
+                                            <p:strVal val="#ppt_x"/>
+                                          </p:val>
+                                        </p:tav>
+                                      </p:tavLst>
+                                    </p:anim>
+                                    <p:anim calcmode="lin" valueType="num">
+                                      <p:cBhvr>
+                                        <p:cTn id="27" dur="1000" fill="hold"/>
+                                        <p:tgtEl>
+                                          <p:spTgt spid="114">
+                                            <p:txEl>
+                                              <p:pRg st="3" end="3"/>
+                                            </p:txEl>
+                                          </p:spTgt>
+                                        </p:tgtEl>
+                                        <p:attrNameLst>
+                                          <p:attrName>ppt_y</p:attrName>
+                                        </p:attrNameLst>
+                                      </p:cBhvr>
+                                      <p:tavLst>
+                                        <p:tav tm="0">
+                                          <p:val>
+                                            <p:strVal val="#ppt_y+.1"/>
+                                          </p:val>
+                                        </p:tav>
+                                        <p:tav tm="100000">
+                                          <p:val>
+                                            <p:strVal val="#ppt_y"/>
+                                          </p:val>
+                                        </p:tav>
+                                      </p:tavLst>
+                                    </p:anim>
+                                  </p:childTnLst>
+                                </p:cTn>
+                              </p:par>
+                            </p:childTnLst>
+                          </p:cTn>
+                        </p:par>
+                      </p:childTnLst>
+                    </p:cTn>
+                  </p:par>
+                </p:childTnLst>
+              </p:cTn>
+              <p:prevCondLst>
+                <p:cond evt="onPrev" delay="0">
+                  <p:tgtEl>
+                    <p:sldTgt/>
+                  </p:tgtEl>
+                </p:cond>
+              </p:prevCondLst>
+              <p:nextCondLst>
+                <p:cond evt="onNext" delay="0">
+                  <p:tgtEl>
+                    <p:sldTgt/>
+                  </p:tgtEl>
+                </p:cond>
+              </p:nextCondLst>
+            </p:seq>
+          </p:childTnLst>
+        </p:cTn>
+      </p:par>
+    </p:tnLst>
+    <p:bldLst>
+      <p:bldP spid="114" grpId="0" uiExpand="1" build="p"/>
+    </p:bldLst>
+  </p:timing>
 </p:sld>
 </file>
 
@@ -12984,6 +14396,13 @@
   <p:clrMapOvr>
     <a:masterClrMapping/>
   </p:clrMapOvr>
+  <p:timing>
+    <p:tnLst>
+      <p:par>
+        <p:cTn id="1" dur="indefinite" restart="never" nodeType="tmRoot"/>
+      </p:par>
+    </p:tnLst>
+  </p:timing>
 </p:sld>
 </file>
 

</xml_diff>